<commit_message>
Updating slide and notebook headers.
</commit_message>
<xml_diff>
--- a/lectures/week5/lecture3/slides/week5_lecture3.pptx
+++ b/lectures/week5/lecture3/slides/week5_lecture3.pptx
@@ -2011,7 +2011,7 @@
                   <a:schemeClr val="accent6"/>
                 </a:solidFill>
               </a:rPr>
-              <a:t>6</a:t>
+              <a:t>5</a:t>
             </a:r>
             <a:r>
               <a:rPr lang="en-US" b="1" dirty="0"/>
@@ -2035,7 +2035,7 @@
                   <a:schemeClr val="accent6"/>
                 </a:solidFill>
               </a:rPr>
-              <a:t>1 </a:t>
+              <a:t>3 </a:t>
             </a:r>
             <a:r>
               <a:rPr lang="en-US" dirty="0">
@@ -2051,7 +2051,7 @@
                   <a:schemeClr val="accent6"/>
                 </a:solidFill>
               </a:rPr>
-              <a:t>6</a:t>
+              <a:t>5</a:t>
             </a:r>
             <a:r>
               <a:rPr lang="en-US" dirty="0"/>
@@ -2063,7 +2063,7 @@
                   <a:schemeClr val="accent6"/>
                 </a:solidFill>
               </a:rPr>
-              <a:t>1</a:t>
+              <a:t>3</a:t>
             </a:r>
             <a:r>
               <a:rPr lang="en-US" dirty="0">
@@ -14281,7 +14281,7 @@
                   <a:schemeClr val="accent6"/>
                 </a:solidFill>
               </a:rPr>
-              <a:t>6</a:t>
+              <a:t>5</a:t>
             </a:r>
             <a:r>
               <a:rPr lang="en-US" b="1" dirty="0"/>
@@ -14305,7 +14305,7 @@
                   <a:schemeClr val="accent6"/>
                 </a:solidFill>
               </a:rPr>
-              <a:t>1 </a:t>
+              <a:t>3 </a:t>
             </a:r>
             <a:r>
               <a:rPr lang="en-US" dirty="0">
@@ -14321,7 +14321,7 @@
                   <a:schemeClr val="accent6"/>
                 </a:solidFill>
               </a:rPr>
-              <a:t>6</a:t>
+              <a:t>5</a:t>
             </a:r>
             <a:r>
               <a:rPr lang="en-US" dirty="0"/>
@@ -14333,7 +14333,7 @@
                   <a:schemeClr val="accent6"/>
                 </a:solidFill>
               </a:rPr>
-              <a:t>1</a:t>
+              <a:t>3</a:t>
             </a:r>
             <a:r>
               <a:rPr lang="en-US" dirty="0">

</xml_diff>